<commit_message>
02_pandas/07.Tarih_Saat_Index_parse_date.ipynb içine ekleme yapıldı
</commit_message>
<xml_diff>
--- a/sunumlar/04_Çoklu_Regresyon++.pptx
+++ b/sunumlar/04_Çoklu_Regresyon++.pptx
@@ -138,7 +138,7 @@
   <pc:docChgLst>
     <pc:chgData name="Erkan ŞİRİN" userId="7f10ce1d6aaf8c5d" providerId="LiveId" clId="{9661A3BA-0490-4FFD-B1A9-7009426F98DB}"/>
     <pc:docChg chg="undo custSel modSld">
-      <pc:chgData name="Erkan ŞİRİN" userId="7f10ce1d6aaf8c5d" providerId="LiveId" clId="{9661A3BA-0490-4FFD-B1A9-7009426F98DB}" dt="2019-03-28T07:30:02.208" v="88" actId="14100"/>
+      <pc:chgData name="Erkan ŞİRİN" userId="7f10ce1d6aaf8c5d" providerId="LiveId" clId="{9661A3BA-0490-4FFD-B1A9-7009426F98DB}" dt="2019-03-30T13:32:37.476" v="90" actId="20577"/>
       <pc:docMkLst>
         <pc:docMk/>
       </pc:docMkLst>
@@ -197,12 +197,20 @@
           </ac:picMkLst>
         </pc:picChg>
       </pc:sldChg>
-      <pc:sldChg chg="delSp">
-        <pc:chgData name="Erkan ŞİRİN" userId="7f10ce1d6aaf8c5d" providerId="LiveId" clId="{9661A3BA-0490-4FFD-B1A9-7009426F98DB}" dt="2019-03-28T07:20:31.976" v="6" actId="478"/>
+      <pc:sldChg chg="delSp modSp">
+        <pc:chgData name="Erkan ŞİRİN" userId="7f10ce1d6aaf8c5d" providerId="LiveId" clId="{9661A3BA-0490-4FFD-B1A9-7009426F98DB}" dt="2019-03-30T13:32:37.476" v="90" actId="20577"/>
         <pc:sldMkLst>
           <pc:docMk/>
           <pc:sldMk cId="982979241" sldId="266"/>
         </pc:sldMkLst>
+        <pc:spChg chg="mod">
+          <ac:chgData name="Erkan ŞİRİN" userId="7f10ce1d6aaf8c5d" providerId="LiveId" clId="{9661A3BA-0490-4FFD-B1A9-7009426F98DB}" dt="2019-03-30T13:32:37.476" v="90" actId="20577"/>
+          <ac:spMkLst>
+            <pc:docMk/>
+            <pc:sldMk cId="982979241" sldId="266"/>
+            <ac:spMk id="14" creationId="{21A97CAA-40FD-4063-9E9C-472156513B5C}"/>
+          </ac:spMkLst>
+        </pc:spChg>
         <pc:grpChg chg="del">
           <ac:chgData name="Erkan ŞİRİN" userId="7f10ce1d6aaf8c5d" providerId="LiveId" clId="{9661A3BA-0490-4FFD-B1A9-7009426F98DB}" dt="2019-03-28T07:20:31.976" v="6" actId="478"/>
           <ac:grpSpMkLst>
@@ -445,7 +453,7 @@
           <a:p>
             <a:fld id="{6F77F576-AE14-466D-AA6B-335273622B21}" type="datetimeFigureOut">
               <a:rPr lang="en-US" smtClean="0"/>
-              <a:t>3/28/2019</a:t>
+              <a:t>3/30/2019</a:t>
             </a:fld>
             <a:endParaRPr lang="en-US"/>
           </a:p>
@@ -844,7 +852,7 @@
           <a:p>
             <a:fld id="{54AA066D-271F-4C1A-B89A-0705A7689EE9}" type="datetimeFigureOut">
               <a:rPr lang="en-US" smtClean="0"/>
-              <a:t>3/28/2019</a:t>
+              <a:t>3/30/2019</a:t>
             </a:fld>
             <a:endParaRPr lang="en-US"/>
           </a:p>
@@ -1014,7 +1022,7 @@
           <a:p>
             <a:fld id="{54AA066D-271F-4C1A-B89A-0705A7689EE9}" type="datetimeFigureOut">
               <a:rPr lang="en-US" smtClean="0"/>
-              <a:t>3/28/2019</a:t>
+              <a:t>3/30/2019</a:t>
             </a:fld>
             <a:endParaRPr lang="en-US"/>
           </a:p>
@@ -1194,7 +1202,7 @@
           <a:p>
             <a:fld id="{54AA066D-271F-4C1A-B89A-0705A7689EE9}" type="datetimeFigureOut">
               <a:rPr lang="en-US" smtClean="0"/>
-              <a:t>3/28/2019</a:t>
+              <a:t>3/30/2019</a:t>
             </a:fld>
             <a:endParaRPr lang="en-US"/>
           </a:p>
@@ -1364,7 +1372,7 @@
           <a:p>
             <a:fld id="{54AA066D-271F-4C1A-B89A-0705A7689EE9}" type="datetimeFigureOut">
               <a:rPr lang="en-US" smtClean="0"/>
-              <a:t>3/28/2019</a:t>
+              <a:t>3/30/2019</a:t>
             </a:fld>
             <a:endParaRPr lang="en-US"/>
           </a:p>
@@ -1610,7 +1618,7 @@
           <a:p>
             <a:fld id="{54AA066D-271F-4C1A-B89A-0705A7689EE9}" type="datetimeFigureOut">
               <a:rPr lang="en-US" smtClean="0"/>
-              <a:t>3/28/2019</a:t>
+              <a:t>3/30/2019</a:t>
             </a:fld>
             <a:endParaRPr lang="en-US"/>
           </a:p>
@@ -1842,7 +1850,7 @@
           <a:p>
             <a:fld id="{54AA066D-271F-4C1A-B89A-0705A7689EE9}" type="datetimeFigureOut">
               <a:rPr lang="en-US" smtClean="0"/>
-              <a:t>3/28/2019</a:t>
+              <a:t>3/30/2019</a:t>
             </a:fld>
             <a:endParaRPr lang="en-US"/>
           </a:p>
@@ -2209,7 +2217,7 @@
           <a:p>
             <a:fld id="{54AA066D-271F-4C1A-B89A-0705A7689EE9}" type="datetimeFigureOut">
               <a:rPr lang="en-US" smtClean="0"/>
-              <a:t>3/28/2019</a:t>
+              <a:t>3/30/2019</a:t>
             </a:fld>
             <a:endParaRPr lang="en-US"/>
           </a:p>
@@ -2327,7 +2335,7 @@
           <a:p>
             <a:fld id="{54AA066D-271F-4C1A-B89A-0705A7689EE9}" type="datetimeFigureOut">
               <a:rPr lang="en-US" smtClean="0"/>
-              <a:t>3/28/2019</a:t>
+              <a:t>3/30/2019</a:t>
             </a:fld>
             <a:endParaRPr lang="en-US"/>
           </a:p>
@@ -2422,7 +2430,7 @@
           <a:p>
             <a:fld id="{54AA066D-271F-4C1A-B89A-0705A7689EE9}" type="datetimeFigureOut">
               <a:rPr lang="en-US" smtClean="0"/>
-              <a:t>3/28/2019</a:t>
+              <a:t>3/30/2019</a:t>
             </a:fld>
             <a:endParaRPr lang="en-US"/>
           </a:p>
@@ -2699,7 +2707,7 @@
           <a:p>
             <a:fld id="{54AA066D-271F-4C1A-B89A-0705A7689EE9}" type="datetimeFigureOut">
               <a:rPr lang="en-US" smtClean="0"/>
-              <a:t>3/28/2019</a:t>
+              <a:t>3/30/2019</a:t>
             </a:fld>
             <a:endParaRPr lang="en-US"/>
           </a:p>
@@ -2952,7 +2960,7 @@
           <a:p>
             <a:fld id="{54AA066D-271F-4C1A-B89A-0705A7689EE9}" type="datetimeFigureOut">
               <a:rPr lang="en-US" smtClean="0"/>
-              <a:t>3/28/2019</a:t>
+              <a:t>3/30/2019</a:t>
             </a:fld>
             <a:endParaRPr lang="en-US"/>
           </a:p>
@@ -3165,7 +3173,7 @@
           <a:p>
             <a:fld id="{54AA066D-271F-4C1A-B89A-0705A7689EE9}" type="datetimeFigureOut">
               <a:rPr lang="en-US" smtClean="0"/>
-              <a:t>3/28/2019</a:t>
+              <a:t>3/30/2019</a:t>
             </a:fld>
             <a:endParaRPr lang="en-US"/>
           </a:p>
@@ -4878,8 +4886,8 @@
           </a:prstGeom>
         </p:spPr>
       </p:pic>
-      <mc:AlternateContent xmlns:mc="http://schemas.openxmlformats.org/markup-compatibility/2006" xmlns:a14="http://schemas.microsoft.com/office/drawing/2010/main">
-        <mc:Choice Requires="a14">
+      <mc:AlternateContent xmlns:mc="http://schemas.openxmlformats.org/markup-compatibility/2006">
+        <mc:Choice xmlns:a14="http://schemas.microsoft.com/office/drawing/2010/main" Requires="a14">
           <p:sp>
             <p:nvSpPr>
               <p:cNvPr id="14" name="Metin kutusu 13">
@@ -5093,7 +5101,7 @@
             </p:txBody>
           </p:sp>
         </mc:Choice>
-        <mc:Fallback xmlns="">
+        <mc:Fallback>
           <p:sp>
             <p:nvSpPr>
               <p:cNvPr id="14" name="Metin kutusu 13">
@@ -5117,7 +5125,7 @@
                 <a:avLst/>
               </a:prstGeom>
               <a:blipFill>
-                <a:blip r:embed="rId4"/>
+                <a:blip r:embed="rId3"/>
                 <a:stretch>
                   <a:fillRect t="-24286" b="-51429"/>
                 </a:stretch>

</xml_diff>